<commit_message>
Update final HW slide in tips and tricks
</commit_message>
<xml_diff>
--- a/Presentations/4. TipsAndTricks.pptx
+++ b/Presentations/4. TipsAndTricks.pptx
@@ -218,12 +218,655 @@
 </p:presentation>
 </file>
 
-<file path=ppt/revisionInfo.xml><?xml version="1.0" encoding="utf-8"?>
-<p1510:revInfo xmlns:a="http://schemas.openxmlformats.org/drawingml/2006/main" xmlns:r="http://schemas.openxmlformats.org/officeDocument/2006/relationships" xmlns:p1510="http://schemas.microsoft.com/office/powerpoint/2015/10/main"/>
-</file>
-
 <file path=ppt/changesInfos/changesInfo1.xml><?xml version="1.0" encoding="utf-8"?>
 <pc:chgInfo xmlns:a="http://schemas.openxmlformats.org/drawingml/2006/main" xmlns:r="http://schemas.openxmlformats.org/officeDocument/2006/relationships" xmlns:ac="http://schemas.microsoft.com/office/drawing/2013/main/command" xmlns:pc="http://schemas.microsoft.com/office/powerpoint/2013/main/command">
+  <pc:docChgLst>
+    <pc:chgData name="Kristofer Carta" userId="a949ead7c4bcd18f" providerId="LiveId" clId="{DC448491-B5B1-4C54-A7C5-1DD1B9C52ECE}"/>
+    <pc:docChg chg="undo custSel addSld modSld">
+      <pc:chgData name="Kristofer Carta" userId="a949ead7c4bcd18f" providerId="LiveId" clId="{DC448491-B5B1-4C54-A7C5-1DD1B9C52ECE}" dt="2017-08-21T20:28:02.885" v="1132" actId="20577"/>
+      <pc:docMkLst>
+        <pc:docMk/>
+      </pc:docMkLst>
+      <pc:sldChg chg="addSp delSp modSp add">
+        <pc:chgData name="Kristofer Carta" userId="a949ead7c4bcd18f" providerId="LiveId" clId="{DC448491-B5B1-4C54-A7C5-1DD1B9C52ECE}" dt="2017-08-21T20:22:07.315" v="611" actId="20577"/>
+        <pc:sldMkLst>
+          <pc:docMk/>
+          <pc:sldMk cId="258584565" sldId="272"/>
+        </pc:sldMkLst>
+        <pc:spChg chg="mod">
+          <ac:chgData name="Kristofer Carta" userId="a949ead7c4bcd18f" providerId="LiveId" clId="{DC448491-B5B1-4C54-A7C5-1DD1B9C52ECE}" dt="2017-08-21T20:17:44.736" v="36" actId="20577"/>
+          <ac:spMkLst>
+            <pc:docMk/>
+            <pc:sldMk cId="258584565" sldId="272"/>
+            <ac:spMk id="2" creationId="{26C127DD-EA79-4DA7-8B10-7DEE97CE2EAE}"/>
+          </ac:spMkLst>
+        </pc:spChg>
+        <pc:spChg chg="mod">
+          <ac:chgData name="Kristofer Carta" userId="a949ead7c4bcd18f" providerId="LiveId" clId="{DC448491-B5B1-4C54-A7C5-1DD1B9C52ECE}" dt="2017-08-21T20:22:07.315" v="611" actId="20577"/>
+          <ac:spMkLst>
+            <pc:docMk/>
+            <pc:sldMk cId="258584565" sldId="272"/>
+            <ac:spMk id="3" creationId="{D1B1226A-9863-424B-B2FF-DB7AD831C5A3}"/>
+          </ac:spMkLst>
+        </pc:spChg>
+        <pc:spChg chg="add del">
+          <ac:chgData name="Kristofer Carta" userId="a949ead7c4bcd18f" providerId="LiveId" clId="{DC448491-B5B1-4C54-A7C5-1DD1B9C52ECE}" dt="2017-08-21T20:17:48.523" v="38" actId="20577"/>
+          <ac:spMkLst>
+            <pc:docMk/>
+            <pc:sldMk cId="258584565" sldId="272"/>
+            <ac:spMk id="4" creationId="{49A086BC-9F08-4B1D-8D9A-0FDABF38D2CB}"/>
+          </ac:spMkLst>
+        </pc:spChg>
+      </pc:sldChg>
+      <pc:sldChg chg="modSp add">
+        <pc:chgData name="Kristofer Carta" userId="a949ead7c4bcd18f" providerId="LiveId" clId="{DC448491-B5B1-4C54-A7C5-1DD1B9C52ECE}" dt="2017-08-21T20:28:02.885" v="1132" actId="20577"/>
+        <pc:sldMkLst>
+          <pc:docMk/>
+          <pc:sldMk cId="2889338845" sldId="273"/>
+        </pc:sldMkLst>
+        <pc:spChg chg="mod">
+          <ac:chgData name="Kristofer Carta" userId="a949ead7c4bcd18f" providerId="LiveId" clId="{DC448491-B5B1-4C54-A7C5-1DD1B9C52ECE}" dt="2017-08-21T20:17:56.289" v="48" actId="20577"/>
+          <ac:spMkLst>
+            <pc:docMk/>
+            <pc:sldMk cId="2889338845" sldId="273"/>
+            <ac:spMk id="2" creationId="{26C127DD-EA79-4DA7-8B10-7DEE97CE2EAE}"/>
+          </ac:spMkLst>
+        </pc:spChg>
+        <pc:spChg chg="mod">
+          <ac:chgData name="Kristofer Carta" userId="a949ead7c4bcd18f" providerId="LiveId" clId="{DC448491-B5B1-4C54-A7C5-1DD1B9C52ECE}" dt="2017-08-21T20:28:02.885" v="1132" actId="20577"/>
+          <ac:spMkLst>
+            <pc:docMk/>
+            <pc:sldMk cId="2889338845" sldId="273"/>
+            <ac:spMk id="3" creationId="{D1B1226A-9863-424B-B2FF-DB7AD831C5A3}"/>
+          </ac:spMkLst>
+        </pc:spChg>
+      </pc:sldChg>
+    </pc:docChg>
+  </pc:docChgLst>
+  <pc:docChgLst>
+    <pc:chgData name="Kristofer Carta" userId="a949ead7c4bcd18f" providerId="LiveId" clId="{EE21B5BA-F702-4589-8258-402869B4781F}"/>
+    <pc:docChg chg="undo redo custSel addSld modSld sldOrd delSection">
+      <pc:chgData name="Kristofer Carta" userId="a949ead7c4bcd18f" providerId="LiveId" clId="{EE21B5BA-F702-4589-8258-402869B4781F}" dt="2017-08-22T10:23:23.672" v="1449" actId="1038"/>
+      <pc:docMkLst>
+        <pc:docMk/>
+      </pc:docMkLst>
+      <pc:sldChg chg="modSp">
+        <pc:chgData name="Kristofer Carta" userId="a949ead7c4bcd18f" providerId="LiveId" clId="{EE21B5BA-F702-4589-8258-402869B4781F}" dt="2017-08-22T10:23:23.672" v="1449" actId="1038"/>
+        <pc:sldMkLst>
+          <pc:docMk/>
+          <pc:sldMk cId="974364153" sldId="256"/>
+        </pc:sldMkLst>
+        <pc:spChg chg="mod">
+          <ac:chgData name="Kristofer Carta" userId="a949ead7c4bcd18f" providerId="LiveId" clId="{EE21B5BA-F702-4589-8258-402869B4781F}" dt="2017-08-22T10:23:23.672" v="1449" actId="1038"/>
+          <ac:spMkLst>
+            <pc:docMk/>
+            <pc:sldMk cId="974364153" sldId="256"/>
+            <ac:spMk id="3" creationId="{BB7D2EFF-91D1-4FCE-84B8-A7286782BC3D}"/>
+          </ac:spMkLst>
+        </pc:spChg>
+      </pc:sldChg>
+      <pc:sldChg chg="addSp delSp modSp delDesignElem">
+        <pc:chgData name="Kristofer Carta" userId="a949ead7c4bcd18f" providerId="LiveId" clId="{EE21B5BA-F702-4589-8258-402869B4781F}" dt="2017-08-21T21:02:38.352" v="371" actId="20577"/>
+        <pc:sldMkLst>
+          <pc:docMk/>
+          <pc:sldMk cId="3212783590" sldId="258"/>
+        </pc:sldMkLst>
+        <pc:spChg chg="mod">
+          <ac:chgData name="Kristofer Carta" userId="a949ead7c4bcd18f" providerId="LiveId" clId="{EE21B5BA-F702-4589-8258-402869B4781F}" dt="2017-08-21T21:02:38.352" v="371" actId="20577"/>
+          <ac:spMkLst>
+            <pc:docMk/>
+            <pc:sldMk cId="3212783590" sldId="258"/>
+            <ac:spMk id="3" creationId="{05F9B296-6FED-46D7-B938-C6029FE5AE22}"/>
+          </ac:spMkLst>
+        </pc:spChg>
+        <pc:spChg chg="add del">
+          <ac:chgData name="Kristofer Carta" userId="a949ead7c4bcd18f" providerId="LiveId" clId="{EE21B5BA-F702-4589-8258-402869B4781F}" dt="2017-08-21T20:57:24.235" v="162" actId="20577"/>
+          <ac:spMkLst>
+            <pc:docMk/>
+            <pc:sldMk cId="3212783590" sldId="258"/>
+            <ac:spMk id="12" creationId="{00000000-0000-0000-0000-000000000000}"/>
+          </ac:spMkLst>
+        </pc:spChg>
+      </pc:sldChg>
+      <pc:sldChg chg="addSp delSp ord delDesignElem">
+        <pc:chgData name="Kristofer Carta" userId="a949ead7c4bcd18f" providerId="LiveId" clId="{EE21B5BA-F702-4589-8258-402869B4781F}" dt="2017-08-21T21:03:15.676" v="380" actId="113"/>
+        <pc:sldMkLst>
+          <pc:docMk/>
+          <pc:sldMk cId="1871955869" sldId="259"/>
+        </pc:sldMkLst>
+        <pc:spChg chg="add del">
+          <ac:chgData name="Kristofer Carta" userId="a949ead7c4bcd18f" providerId="LiveId" clId="{EE21B5BA-F702-4589-8258-402869B4781F}" dt="2017-08-21T20:57:24.235" v="162" actId="113"/>
+          <ac:spMkLst>
+            <pc:docMk/>
+            <pc:sldMk cId="1871955869" sldId="259"/>
+            <ac:spMk id="85" creationId="{00000000-0000-0000-0000-000000000000}"/>
+          </ac:spMkLst>
+        </pc:spChg>
+        <pc:spChg chg="add del">
+          <ac:chgData name="Kristofer Carta" userId="a949ead7c4bcd18f" providerId="LiveId" clId="{EE21B5BA-F702-4589-8258-402869B4781F}" dt="2017-08-21T20:57:24.235" v="162" actId="113"/>
+          <ac:spMkLst>
+            <pc:docMk/>
+            <pc:sldMk cId="1871955869" sldId="259"/>
+            <ac:spMk id="1043" creationId="{00000000-0000-0000-0000-000000000000}"/>
+          </ac:spMkLst>
+        </pc:spChg>
+        <pc:cxnChg chg="add del">
+          <ac:chgData name="Kristofer Carta" userId="a949ead7c4bcd18f" providerId="LiveId" clId="{EE21B5BA-F702-4589-8258-402869B4781F}" dt="2017-08-21T20:57:24.235" v="162" actId="113"/>
+          <ac:cxnSpMkLst>
+            <pc:docMk/>
+            <pc:sldMk cId="1871955869" sldId="259"/>
+            <ac:cxnSpMk id="87" creationId="{00000000-0000-0000-0000-000000000000}"/>
+          </ac:cxnSpMkLst>
+        </pc:cxnChg>
+      </pc:sldChg>
+      <pc:sldChg chg="addSp delSp modSp delDesignElem">
+        <pc:chgData name="Kristofer Carta" userId="a949ead7c4bcd18f" providerId="LiveId" clId="{EE21B5BA-F702-4589-8258-402869B4781F}" dt="2017-08-21T21:14:10.899" v="493" actId="20577"/>
+        <pc:sldMkLst>
+          <pc:docMk/>
+          <pc:sldMk cId="3956988050" sldId="260"/>
+        </pc:sldMkLst>
+        <pc:spChg chg="mod">
+          <ac:chgData name="Kristofer Carta" userId="a949ead7c4bcd18f" providerId="LiveId" clId="{EE21B5BA-F702-4589-8258-402869B4781F}" dt="2017-08-21T21:14:10.899" v="493" actId="20577"/>
+          <ac:spMkLst>
+            <pc:docMk/>
+            <pc:sldMk cId="3956988050" sldId="260"/>
+            <ac:spMk id="3" creationId="{FFC353AD-FA04-47E2-BB20-54AD62996ABA}"/>
+          </ac:spMkLst>
+        </pc:spChg>
+        <pc:spChg chg="add del">
+          <ac:chgData name="Kristofer Carta" userId="a949ead7c4bcd18f" providerId="LiveId" clId="{EE21B5BA-F702-4589-8258-402869B4781F}" dt="2017-08-21T20:57:24.235" v="162" actId="113"/>
+          <ac:spMkLst>
+            <pc:docMk/>
+            <pc:sldMk cId="3956988050" sldId="260"/>
+            <ac:spMk id="27" creationId="{00000000-0000-0000-0000-000000000000}"/>
+          </ac:spMkLst>
+        </pc:spChg>
+        <pc:spChg chg="add del">
+          <ac:chgData name="Kristofer Carta" userId="a949ead7c4bcd18f" providerId="LiveId" clId="{EE21B5BA-F702-4589-8258-402869B4781F}" dt="2017-08-21T20:57:24.235" v="162" actId="113"/>
+          <ac:spMkLst>
+            <pc:docMk/>
+            <pc:sldMk cId="3956988050" sldId="260"/>
+            <ac:spMk id="28" creationId="{00000000-0000-0000-0000-000000000000}"/>
+          </ac:spMkLst>
+        </pc:spChg>
+      </pc:sldChg>
+      <pc:sldChg chg="addSp delSp modSp delDesignElem">
+        <pc:chgData name="Kristofer Carta" userId="a949ead7c4bcd18f" providerId="LiveId" clId="{EE21B5BA-F702-4589-8258-402869B4781F}" dt="2017-08-21T20:57:24.235" v="162" actId="113"/>
+        <pc:sldMkLst>
+          <pc:docMk/>
+          <pc:sldMk cId="1483780471" sldId="261"/>
+        </pc:sldMkLst>
+        <pc:spChg chg="mod">
+          <ac:chgData name="Kristofer Carta" userId="a949ead7c4bcd18f" providerId="LiveId" clId="{EE21B5BA-F702-4589-8258-402869B4781F}" dt="2017-08-21T20:54:21.327" v="118" actId="20577"/>
+          <ac:spMkLst>
+            <pc:docMk/>
+            <pc:sldMk cId="1483780471" sldId="261"/>
+            <ac:spMk id="3" creationId="{B6466418-089E-4177-8FBC-1155E9BB8870}"/>
+          </ac:spMkLst>
+        </pc:spChg>
+        <pc:spChg chg="add del">
+          <ac:chgData name="Kristofer Carta" userId="a949ead7c4bcd18f" providerId="LiveId" clId="{EE21B5BA-F702-4589-8258-402869B4781F}" dt="2017-08-21T20:57:24.235" v="162" actId="113"/>
+          <ac:spMkLst>
+            <pc:docMk/>
+            <pc:sldMk cId="1483780471" sldId="261"/>
+            <ac:spMk id="71" creationId="{00000000-0000-0000-0000-000000000000}"/>
+          </ac:spMkLst>
+        </pc:spChg>
+      </pc:sldChg>
+      <pc:sldChg chg="addSp delSp modSp mod setBg setClrOvrMap">
+        <pc:chgData name="Kristofer Carta" userId="a949ead7c4bcd18f" providerId="LiveId" clId="{EE21B5BA-F702-4589-8258-402869B4781F}" dt="2017-08-21T20:59:44.640" v="251" actId="113"/>
+        <pc:sldMkLst>
+          <pc:docMk/>
+          <pc:sldMk cId="2700095255" sldId="265"/>
+        </pc:sldMkLst>
+        <pc:spChg chg="mod">
+          <ac:chgData name="Kristofer Carta" userId="a949ead7c4bcd18f" providerId="LiveId" clId="{EE21B5BA-F702-4589-8258-402869B4781F}" dt="2017-08-21T20:57:16.726" v="154" actId="1076"/>
+          <ac:spMkLst>
+            <pc:docMk/>
+            <pc:sldMk cId="2700095255" sldId="265"/>
+            <ac:spMk id="2" creationId="{B25C8939-68B1-4966-B6F0-0CB9790784DD}"/>
+          </ac:spMkLst>
+        </pc:spChg>
+        <pc:spChg chg="add del mod">
+          <ac:chgData name="Kristofer Carta" userId="a949ead7c4bcd18f" providerId="LiveId" clId="{EE21B5BA-F702-4589-8258-402869B4781F}" dt="2017-08-21T20:59:44.640" v="251" actId="113"/>
+          <ac:spMkLst>
+            <pc:docMk/>
+            <pc:sldMk cId="2700095255" sldId="265"/>
+            <ac:spMk id="3" creationId="{9DB25D54-DF59-4420-A50E-BCB89C484DB5}"/>
+          </ac:spMkLst>
+        </pc:spChg>
+        <pc:spChg chg="add del">
+          <ac:chgData name="Kristofer Carta" userId="a949ead7c4bcd18f" providerId="LiveId" clId="{EE21B5BA-F702-4589-8258-402869B4781F}" dt="2017-08-21T20:57:03.379" v="146" actId="26606"/>
+          <ac:spMkLst>
+            <pc:docMk/>
+            <pc:sldMk cId="2700095255" sldId="265"/>
+            <ac:spMk id="6" creationId="{00000000-0000-0000-0000-000000000000}"/>
+          </ac:spMkLst>
+        </pc:spChg>
+        <pc:spChg chg="add del">
+          <ac:chgData name="Kristofer Carta" userId="a949ead7c4bcd18f" providerId="LiveId" clId="{EE21B5BA-F702-4589-8258-402869B4781F}" dt="2017-08-21T20:57:07.026" v="148" actId="26606"/>
+          <ac:spMkLst>
+            <pc:docMk/>
+            <pc:sldMk cId="2700095255" sldId="265"/>
+            <ac:spMk id="9" creationId="{00000000-0000-0000-0000-000000000000}"/>
+          </ac:spMkLst>
+        </pc:spChg>
+        <pc:spChg chg="add del">
+          <ac:chgData name="Kristofer Carta" userId="a949ead7c4bcd18f" providerId="LiveId" clId="{EE21B5BA-F702-4589-8258-402869B4781F}" dt="2017-08-21T20:56:05.823" v="133" actId="26606"/>
+          <ac:spMkLst>
+            <pc:docMk/>
+            <pc:sldMk cId="2700095255" sldId="265"/>
+            <ac:spMk id="10" creationId="{00000000-0000-0000-0000-000000000000}"/>
+          </ac:spMkLst>
+        </pc:spChg>
+        <pc:spChg chg="add del">
+          <ac:chgData name="Kristofer Carta" userId="a949ead7c4bcd18f" providerId="LiveId" clId="{EE21B5BA-F702-4589-8258-402869B4781F}" dt="2017-08-21T20:56:09.995" v="135" actId="26606"/>
+          <ac:spMkLst>
+            <pc:docMk/>
+            <pc:sldMk cId="2700095255" sldId="265"/>
+            <ac:spMk id="12" creationId="{00000000-0000-0000-0000-000000000000}"/>
+          </ac:spMkLst>
+        </pc:spChg>
+        <pc:spChg chg="add del">
+          <ac:chgData name="Kristofer Carta" userId="a949ead7c4bcd18f" providerId="LiveId" clId="{EE21B5BA-F702-4589-8258-402869B4781F}" dt="2017-08-21T20:56:09.995" v="135" actId="26606"/>
+          <ac:spMkLst>
+            <pc:docMk/>
+            <pc:sldMk cId="2700095255" sldId="265"/>
+            <ac:spMk id="13" creationId="{00000000-0000-0000-0000-000000000000}"/>
+          </ac:spMkLst>
+        </pc:spChg>
+        <pc:spChg chg="add del">
+          <ac:chgData name="Kristofer Carta" userId="a949ead7c4bcd18f" providerId="LiveId" clId="{EE21B5BA-F702-4589-8258-402869B4781F}" dt="2017-08-21T20:56:12.869" v="139" actId="26606"/>
+          <ac:spMkLst>
+            <pc:docMk/>
+            <pc:sldMk cId="2700095255" sldId="265"/>
+            <ac:spMk id="18" creationId="{00000000-0000-0000-0000-000000000000}"/>
+          </ac:spMkLst>
+        </pc:spChg>
+        <pc:spChg chg="add del">
+          <ac:chgData name="Kristofer Carta" userId="a949ead7c4bcd18f" providerId="LiveId" clId="{EE21B5BA-F702-4589-8258-402869B4781F}" dt="2017-08-21T20:56:12.869" v="139" actId="26606"/>
+          <ac:spMkLst>
+            <pc:docMk/>
+            <pc:sldMk cId="2700095255" sldId="265"/>
+            <ac:spMk id="19" creationId="{00000000-0000-0000-0000-000000000000}"/>
+          </ac:spMkLst>
+        </pc:spChg>
+        <pc:spChg chg="add del">
+          <ac:chgData name="Kristofer Carta" userId="a949ead7c4bcd18f" providerId="LiveId" clId="{EE21B5BA-F702-4589-8258-402869B4781F}" dt="2017-08-21T20:56:12.869" v="139" actId="26606"/>
+          <ac:spMkLst>
+            <pc:docMk/>
+            <pc:sldMk cId="2700095255" sldId="265"/>
+            <ac:spMk id="20" creationId="{00000000-0000-0000-0000-000000000000}"/>
+          </ac:spMkLst>
+        </pc:spChg>
+        <pc:graphicFrameChg chg="add del">
+          <ac:chgData name="Kristofer Carta" userId="a949ead7c4bcd18f" providerId="LiveId" clId="{EE21B5BA-F702-4589-8258-402869B4781F}" dt="2017-08-21T20:56:05.823" v="133" actId="26606"/>
+          <ac:graphicFrameMkLst>
+            <pc:docMk/>
+            <pc:sldMk cId="2700095255" sldId="265"/>
+            <ac:graphicFrameMk id="5" creationId="{00000000-0000-0000-0000-000000000000}"/>
+          </ac:graphicFrameMkLst>
+        </pc:graphicFrameChg>
+        <pc:graphicFrameChg chg="add del">
+          <ac:chgData name="Kristofer Carta" userId="a949ead7c4bcd18f" providerId="LiveId" clId="{EE21B5BA-F702-4589-8258-402869B4781F}" dt="2017-08-21T20:57:03.379" v="146" actId="26606"/>
+          <ac:graphicFrameMkLst>
+            <pc:docMk/>
+            <pc:sldMk cId="2700095255" sldId="265"/>
+            <ac:graphicFrameMk id="7" creationId="{00000000-0000-0000-0000-000000000000}"/>
+          </ac:graphicFrameMkLst>
+        </pc:graphicFrameChg>
+        <pc:graphicFrameChg chg="add del">
+          <ac:chgData name="Kristofer Carta" userId="a949ead7c4bcd18f" providerId="LiveId" clId="{EE21B5BA-F702-4589-8258-402869B4781F}" dt="2017-08-21T20:56:09.995" v="135" actId="26606"/>
+          <ac:graphicFrameMkLst>
+            <pc:docMk/>
+            <pc:sldMk cId="2700095255" sldId="265"/>
+            <ac:graphicFrameMk id="14" creationId="{00000000-0000-0000-0000-000000000000}"/>
+          </ac:graphicFrameMkLst>
+        </pc:graphicFrameChg>
+        <pc:graphicFrameChg chg="add del">
+          <ac:chgData name="Kristofer Carta" userId="a949ead7c4bcd18f" providerId="LiveId" clId="{EE21B5BA-F702-4589-8258-402869B4781F}" dt="2017-08-21T20:57:07.026" v="148" actId="26606"/>
+          <ac:graphicFrameMkLst>
+            <pc:docMk/>
+            <pc:sldMk cId="2700095255" sldId="265"/>
+            <ac:graphicFrameMk id="15" creationId="{00000000-0000-0000-0000-000000000000}"/>
+          </ac:graphicFrameMkLst>
+        </pc:graphicFrameChg>
+        <pc:graphicFrameChg chg="add del">
+          <ac:chgData name="Kristofer Carta" userId="a949ead7c4bcd18f" providerId="LiveId" clId="{EE21B5BA-F702-4589-8258-402869B4781F}" dt="2017-08-21T20:56:11.920" v="137" actId="26606"/>
+          <ac:graphicFrameMkLst>
+            <pc:docMk/>
+            <pc:sldMk cId="2700095255" sldId="265"/>
+            <ac:graphicFrameMk id="16" creationId="{00000000-0000-0000-0000-000000000000}"/>
+          </ac:graphicFrameMkLst>
+        </pc:graphicFrameChg>
+        <pc:graphicFrameChg chg="add del">
+          <ac:chgData name="Kristofer Carta" userId="a949ead7c4bcd18f" providerId="LiveId" clId="{EE21B5BA-F702-4589-8258-402869B4781F}" dt="2017-08-21T20:57:09.354" v="150" actId="26606"/>
+          <ac:graphicFrameMkLst>
+            <pc:docMk/>
+            <pc:sldMk cId="2700095255" sldId="265"/>
+            <ac:graphicFrameMk id="17" creationId="{00000000-0000-0000-0000-000000000000}"/>
+          </ac:graphicFrameMkLst>
+        </pc:graphicFrameChg>
+        <pc:graphicFrameChg chg="add del">
+          <ac:chgData name="Kristofer Carta" userId="a949ead7c4bcd18f" providerId="LiveId" clId="{EE21B5BA-F702-4589-8258-402869B4781F}" dt="2017-08-21T20:56:12.869" v="139" actId="26606"/>
+          <ac:graphicFrameMkLst>
+            <pc:docMk/>
+            <pc:sldMk cId="2700095255" sldId="265"/>
+            <ac:graphicFrameMk id="21" creationId="{00000000-0000-0000-0000-000000000000}"/>
+          </ac:graphicFrameMkLst>
+        </pc:graphicFrameChg>
+        <pc:cxnChg chg="add del">
+          <ac:chgData name="Kristofer Carta" userId="a949ead7c4bcd18f" providerId="LiveId" clId="{EE21B5BA-F702-4589-8258-402869B4781F}" dt="2017-08-21T20:57:07.026" v="148" actId="26606"/>
+          <ac:cxnSpMkLst>
+            <pc:docMk/>
+            <pc:sldMk cId="2700095255" sldId="265"/>
+            <ac:cxnSpMk id="11" creationId="{00000000-0000-0000-0000-000000000000}"/>
+          </ac:cxnSpMkLst>
+        </pc:cxnChg>
+      </pc:sldChg>
+      <pc:sldChg chg="addSp delSp modSp ord">
+        <pc:chgData name="Kristofer Carta" userId="a949ead7c4bcd18f" providerId="LiveId" clId="{EE21B5BA-F702-4589-8258-402869B4781F}" dt="2017-08-21T20:59:53.977" v="259" actId="20577"/>
+        <pc:sldMkLst>
+          <pc:docMk/>
+          <pc:sldMk cId="2413704392" sldId="266"/>
+        </pc:sldMkLst>
+        <pc:spChg chg="mod">
+          <ac:chgData name="Kristofer Carta" userId="a949ead7c4bcd18f" providerId="LiveId" clId="{EE21B5BA-F702-4589-8258-402869B4781F}" dt="2017-08-21T20:58:04.416" v="203" actId="26606"/>
+          <ac:spMkLst>
+            <pc:docMk/>
+            <pc:sldMk cId="2413704392" sldId="266"/>
+            <ac:spMk id="2" creationId="{F988F3E1-779C-4B9E-97FD-01A1B9A3A1CD}"/>
+          </ac:spMkLst>
+        </pc:spChg>
+        <pc:spChg chg="mod">
+          <ac:chgData name="Kristofer Carta" userId="a949ead7c4bcd18f" providerId="LiveId" clId="{EE21B5BA-F702-4589-8258-402869B4781F}" dt="2017-08-21T20:59:53.977" v="259" actId="20577"/>
+          <ac:spMkLst>
+            <pc:docMk/>
+            <pc:sldMk cId="2413704392" sldId="266"/>
+            <ac:spMk id="3" creationId="{67A1AF6A-2F04-4A37-B5E2-0DB309813C9A}"/>
+          </ac:spMkLst>
+        </pc:spChg>
+        <pc:spChg chg="add del">
+          <ac:chgData name="Kristofer Carta" userId="a949ead7c4bcd18f" providerId="LiveId" clId="{EE21B5BA-F702-4589-8258-402869B4781F}" dt="2017-08-21T20:58:04.416" v="203" actId="26606"/>
+          <ac:spMkLst>
+            <pc:docMk/>
+            <pc:sldMk cId="2413704392" sldId="266"/>
+            <ac:spMk id="8" creationId="{00000000-0000-0000-0000-000000000000}"/>
+          </ac:spMkLst>
+        </pc:spChg>
+      </pc:sldChg>
+      <pc:sldChg chg="addSp delSp delDesignElem">
+        <pc:chgData name="Kristofer Carta" userId="a949ead7c4bcd18f" providerId="LiveId" clId="{EE21B5BA-F702-4589-8258-402869B4781F}" dt="2017-08-21T20:57:24.235" v="162" actId="113"/>
+        <pc:sldMkLst>
+          <pc:docMk/>
+          <pc:sldMk cId="2886054059" sldId="268"/>
+        </pc:sldMkLst>
+        <pc:spChg chg="add del">
+          <ac:chgData name="Kristofer Carta" userId="a949ead7c4bcd18f" providerId="LiveId" clId="{EE21B5BA-F702-4589-8258-402869B4781F}" dt="2017-08-21T20:57:24.235" v="162" actId="113"/>
+          <ac:spMkLst>
+            <pc:docMk/>
+            <pc:sldMk cId="2886054059" sldId="268"/>
+            <ac:spMk id="8" creationId="{00000000-0000-0000-0000-000000000000}"/>
+          </ac:spMkLst>
+        </pc:spChg>
+      </pc:sldChg>
+      <pc:sldChg chg="addSp delSp delDesignElem">
+        <pc:chgData name="Kristofer Carta" userId="a949ead7c4bcd18f" providerId="LiveId" clId="{EE21B5BA-F702-4589-8258-402869B4781F}" dt="2017-08-21T20:57:24.235" v="162" actId="113"/>
+        <pc:sldMkLst>
+          <pc:docMk/>
+          <pc:sldMk cId="1087171556" sldId="269"/>
+        </pc:sldMkLst>
+        <pc:spChg chg="add del">
+          <ac:chgData name="Kristofer Carta" userId="a949ead7c4bcd18f" providerId="LiveId" clId="{EE21B5BA-F702-4589-8258-402869B4781F}" dt="2017-08-21T20:57:24.235" v="162" actId="113"/>
+          <ac:spMkLst>
+            <pc:docMk/>
+            <pc:sldMk cId="1087171556" sldId="269"/>
+            <ac:spMk id="8" creationId="{00000000-0000-0000-0000-000000000000}"/>
+          </ac:spMkLst>
+        </pc:spChg>
+      </pc:sldChg>
+      <pc:sldChg chg="addSp delSp modSp mod setBg setClrOvrMap">
+        <pc:chgData name="Kristofer Carta" userId="a949ead7c4bcd18f" providerId="LiveId" clId="{EE21B5BA-F702-4589-8258-402869B4781F}" dt="2017-08-21T21:04:47.605" v="394" actId="20577"/>
+        <pc:sldMkLst>
+          <pc:docMk/>
+          <pc:sldMk cId="2783061044" sldId="271"/>
+        </pc:sldMkLst>
+        <pc:spChg chg="mod">
+          <ac:chgData name="Kristofer Carta" userId="a949ead7c4bcd18f" providerId="LiveId" clId="{EE21B5BA-F702-4589-8258-402869B4781F}" dt="2017-08-21T21:03:41.934" v="384" actId="26606"/>
+          <ac:spMkLst>
+            <pc:docMk/>
+            <pc:sldMk cId="2783061044" sldId="271"/>
+            <ac:spMk id="2" creationId="{682FA6FE-49AC-4D37-B270-E527DFCE236A}"/>
+          </ac:spMkLst>
+        </pc:spChg>
+        <pc:spChg chg="mod">
+          <ac:chgData name="Kristofer Carta" userId="a949ead7c4bcd18f" providerId="LiveId" clId="{EE21B5BA-F702-4589-8258-402869B4781F}" dt="2017-08-21T21:04:47.605" v="394" actId="20577"/>
+          <ac:spMkLst>
+            <pc:docMk/>
+            <pc:sldMk cId="2783061044" sldId="271"/>
+            <ac:spMk id="3" creationId="{CB5CF5F7-55FD-40B2-8557-A3B9DF5E60B1}"/>
+          </ac:spMkLst>
+        </pc:spChg>
+        <pc:spChg chg="add del">
+          <ac:chgData name="Kristofer Carta" userId="a949ead7c4bcd18f" providerId="LiveId" clId="{EE21B5BA-F702-4589-8258-402869B4781F}" dt="2017-08-21T21:03:41.929" v="383" actId="26606"/>
+          <ac:spMkLst>
+            <pc:docMk/>
+            <pc:sldMk cId="2783061044" sldId="271"/>
+            <ac:spMk id="8" creationId="{00000000-0000-0000-0000-000000000000}"/>
+          </ac:spMkLst>
+        </pc:spChg>
+        <pc:spChg chg="add">
+          <ac:chgData name="Kristofer Carta" userId="a949ead7c4bcd18f" providerId="LiveId" clId="{EE21B5BA-F702-4589-8258-402869B4781F}" dt="2017-08-21T21:03:41.934" v="384" actId="26606"/>
+          <ac:spMkLst>
+            <pc:docMk/>
+            <pc:sldMk cId="2783061044" sldId="271"/>
+            <ac:spMk id="12" creationId="{00000000-0000-0000-0000-000000000000}"/>
+          </ac:spMkLst>
+        </pc:spChg>
+        <pc:spChg chg="add">
+          <ac:chgData name="Kristofer Carta" userId="a949ead7c4bcd18f" providerId="LiveId" clId="{EE21B5BA-F702-4589-8258-402869B4781F}" dt="2017-08-21T21:03:41.934" v="384" actId="26606"/>
+          <ac:spMkLst>
+            <pc:docMk/>
+            <pc:sldMk cId="2783061044" sldId="271"/>
+            <ac:spMk id="13" creationId="{00000000-0000-0000-0000-000000000000}"/>
+          </ac:spMkLst>
+        </pc:spChg>
+        <pc:spChg chg="add">
+          <ac:chgData name="Kristofer Carta" userId="a949ead7c4bcd18f" providerId="LiveId" clId="{EE21B5BA-F702-4589-8258-402869B4781F}" dt="2017-08-21T21:03:41.934" v="384" actId="26606"/>
+          <ac:spMkLst>
+            <pc:docMk/>
+            <pc:sldMk cId="2783061044" sldId="271"/>
+            <ac:spMk id="14" creationId="{00000000-0000-0000-0000-000000000000}"/>
+          </ac:spMkLst>
+        </pc:spChg>
+        <pc:cxnChg chg="add del">
+          <ac:chgData name="Kristofer Carta" userId="a949ead7c4bcd18f" providerId="LiveId" clId="{EE21B5BA-F702-4589-8258-402869B4781F}" dt="2017-08-21T21:03:41.929" v="383" actId="26606"/>
+          <ac:cxnSpMkLst>
+            <pc:docMk/>
+            <pc:sldMk cId="2783061044" sldId="271"/>
+            <ac:cxnSpMk id="10" creationId="{00000000-0000-0000-0000-000000000000}"/>
+          </ac:cxnSpMkLst>
+        </pc:cxnChg>
+      </pc:sldChg>
+      <pc:sldChg chg="modSp">
+        <pc:chgData name="Kristofer Carta" userId="a949ead7c4bcd18f" providerId="LiveId" clId="{EE21B5BA-F702-4589-8258-402869B4781F}" dt="2017-08-21T21:06:10.031" v="451" actId="113"/>
+        <pc:sldMkLst>
+          <pc:docMk/>
+          <pc:sldMk cId="258584565" sldId="272"/>
+        </pc:sldMkLst>
+        <pc:spChg chg="mod">
+          <ac:chgData name="Kristofer Carta" userId="a949ead7c4bcd18f" providerId="LiveId" clId="{EE21B5BA-F702-4589-8258-402869B4781F}" dt="2017-08-21T21:06:10.031" v="451" actId="113"/>
+          <ac:spMkLst>
+            <pc:docMk/>
+            <pc:sldMk cId="258584565" sldId="272"/>
+            <ac:spMk id="3" creationId="{D1B1226A-9863-424B-B2FF-DB7AD831C5A3}"/>
+          </ac:spMkLst>
+        </pc:spChg>
+      </pc:sldChg>
+      <pc:sldChg chg="addSp modSp add mod setBg setClrOvrMap">
+        <pc:chgData name="Kristofer Carta" userId="a949ead7c4bcd18f" providerId="LiveId" clId="{EE21B5BA-F702-4589-8258-402869B4781F}" dt="2017-08-21T21:23:13.376" v="739" actId="1076"/>
+        <pc:sldMkLst>
+          <pc:docMk/>
+          <pc:sldMk cId="371282952" sldId="274"/>
+        </pc:sldMkLst>
+        <pc:spChg chg="mod">
+          <ac:chgData name="Kristofer Carta" userId="a949ead7c4bcd18f" providerId="LiveId" clId="{EE21B5BA-F702-4589-8258-402869B4781F}" dt="2017-08-21T21:22:25.797" v="687" actId="26606"/>
+          <ac:spMkLst>
+            <pc:docMk/>
+            <pc:sldMk cId="371282952" sldId="274"/>
+            <ac:spMk id="2" creationId="{BBC4660B-A003-40EA-91DF-E29FCA70ED31}"/>
+          </ac:spMkLst>
+        </pc:spChg>
+        <pc:spChg chg="mod">
+          <ac:chgData name="Kristofer Carta" userId="a949ead7c4bcd18f" providerId="LiveId" clId="{EE21B5BA-F702-4589-8258-402869B4781F}" dt="2017-08-21T21:23:13.376" v="739" actId="1076"/>
+          <ac:spMkLst>
+            <pc:docMk/>
+            <pc:sldMk cId="371282952" sldId="274"/>
+            <ac:spMk id="3" creationId="{CFC9B3E3-1F8E-457A-8A5F-8C16303A7DF9}"/>
+          </ac:spMkLst>
+        </pc:spChg>
+        <pc:spChg chg="add">
+          <ac:chgData name="Kristofer Carta" userId="a949ead7c4bcd18f" providerId="LiveId" clId="{EE21B5BA-F702-4589-8258-402869B4781F}" dt="2017-08-21T21:22:25.797" v="687" actId="26606"/>
+          <ac:spMkLst>
+            <pc:docMk/>
+            <pc:sldMk cId="371282952" sldId="274"/>
+            <ac:spMk id="8" creationId="{00000000-0000-0000-0000-000000000000}"/>
+          </ac:spMkLst>
+        </pc:spChg>
+        <pc:spChg chg="add">
+          <ac:chgData name="Kristofer Carta" userId="a949ead7c4bcd18f" providerId="LiveId" clId="{EE21B5BA-F702-4589-8258-402869B4781F}" dt="2017-08-21T21:22:25.797" v="687" actId="26606"/>
+          <ac:spMkLst>
+            <pc:docMk/>
+            <pc:sldMk cId="371282952" sldId="274"/>
+            <ac:spMk id="10" creationId="{00000000-0000-0000-0000-000000000000}"/>
+          </ac:spMkLst>
+        </pc:spChg>
+        <pc:spChg chg="add">
+          <ac:chgData name="Kristofer Carta" userId="a949ead7c4bcd18f" providerId="LiveId" clId="{EE21B5BA-F702-4589-8258-402869B4781F}" dt="2017-08-21T21:22:25.797" v="687" actId="26606"/>
+          <ac:spMkLst>
+            <pc:docMk/>
+            <pc:sldMk cId="371282952" sldId="274"/>
+            <ac:spMk id="12" creationId="{00000000-0000-0000-0000-000000000000}"/>
+          </ac:spMkLst>
+        </pc:spChg>
+      </pc:sldChg>
+      <pc:sldChg chg="modSp add">
+        <pc:chgData name="Kristofer Carta" userId="a949ead7c4bcd18f" providerId="LiveId" clId="{EE21B5BA-F702-4589-8258-402869B4781F}" dt="2017-08-21T21:32:09.200" v="1340" actId="20577"/>
+        <pc:sldMkLst>
+          <pc:docMk/>
+          <pc:sldMk cId="311738350" sldId="275"/>
+        </pc:sldMkLst>
+        <pc:spChg chg="mod">
+          <ac:chgData name="Kristofer Carta" userId="a949ead7c4bcd18f" providerId="LiveId" clId="{EE21B5BA-F702-4589-8258-402869B4781F}" dt="2017-08-21T21:25:24.680" v="758" actId="20577"/>
+          <ac:spMkLst>
+            <pc:docMk/>
+            <pc:sldMk cId="311738350" sldId="275"/>
+            <ac:spMk id="2" creationId="{50813FC1-0B5C-4E30-980E-03F1557788AA}"/>
+          </ac:spMkLst>
+        </pc:spChg>
+        <pc:spChg chg="mod">
+          <ac:chgData name="Kristofer Carta" userId="a949ead7c4bcd18f" providerId="LiveId" clId="{EE21B5BA-F702-4589-8258-402869B4781F}" dt="2017-08-21T21:32:09.200" v="1340" actId="20577"/>
+          <ac:spMkLst>
+            <pc:docMk/>
+            <pc:sldMk cId="311738350" sldId="275"/>
+            <ac:spMk id="3" creationId="{AADA4A45-4FE9-4FC7-A116-BAF06F399409}"/>
+          </ac:spMkLst>
+        </pc:spChg>
+      </pc:sldChg>
+      <pc:sldChg chg="delSp modSp add">
+        <pc:chgData name="Kristofer Carta" userId="a949ead7c4bcd18f" providerId="LiveId" clId="{EE21B5BA-F702-4589-8258-402869B4781F}" dt="2017-08-21T21:23:47.781" v="749" actId="478"/>
+        <pc:sldMkLst>
+          <pc:docMk/>
+          <pc:sldMk cId="2245622187" sldId="276"/>
+        </pc:sldMkLst>
+        <pc:spChg chg="mod">
+          <ac:chgData name="Kristofer Carta" userId="a949ead7c4bcd18f" providerId="LiveId" clId="{EE21B5BA-F702-4589-8258-402869B4781F}" dt="2017-08-21T21:23:43.290" v="747" actId="20577"/>
+          <ac:spMkLst>
+            <pc:docMk/>
+            <pc:sldMk cId="2245622187" sldId="276"/>
+            <ac:spMk id="2" creationId="{1F1EF97D-66EF-4DCF-9EFF-EA639C490522}"/>
+          </ac:spMkLst>
+        </pc:spChg>
+        <pc:spChg chg="del mod">
+          <ac:chgData name="Kristofer Carta" userId="a949ead7c4bcd18f" providerId="LiveId" clId="{EE21B5BA-F702-4589-8258-402869B4781F}" dt="2017-08-21T21:23:47.781" v="749" actId="478"/>
+          <ac:spMkLst>
+            <pc:docMk/>
+            <pc:sldMk cId="2245622187" sldId="276"/>
+            <ac:spMk id="3" creationId="{807A7C8B-32C2-4824-820A-ED9AC9BA50A6}"/>
+          </ac:spMkLst>
+        </pc:spChg>
+      </pc:sldChg>
+      <pc:sldChg chg="add">
+        <pc:chgData name="Kristofer Carta" userId="a949ead7c4bcd18f" providerId="LiveId" clId="{EE21B5BA-F702-4589-8258-402869B4781F}" dt="2017-08-21T21:23:57.613" v="750" actId="20577"/>
+        <pc:sldMkLst>
+          <pc:docMk/>
+          <pc:sldMk cId="597761154" sldId="277"/>
+        </pc:sldMkLst>
+      </pc:sldChg>
+      <pc:sldChg chg="modSp add">
+        <pc:chgData name="Kristofer Carta" userId="a949ead7c4bcd18f" providerId="LiveId" clId="{EE21B5BA-F702-4589-8258-402869B4781F}" dt="2017-08-22T10:19:24.738" v="1436" actId="20577"/>
+        <pc:sldMkLst>
+          <pc:docMk/>
+          <pc:sldMk cId="3081455738" sldId="278"/>
+        </pc:sldMkLst>
+        <pc:spChg chg="mod">
+          <ac:chgData name="Kristofer Carta" userId="a949ead7c4bcd18f" providerId="LiveId" clId="{EE21B5BA-F702-4589-8258-402869B4781F}" dt="2017-08-21T21:29:27.794" v="1084" actId="20577"/>
+          <ac:spMkLst>
+            <pc:docMk/>
+            <pc:sldMk cId="3081455738" sldId="278"/>
+            <ac:spMk id="2" creationId="{68F475E6-7D37-468D-9AF2-FD15D95A9545}"/>
+          </ac:spMkLst>
+        </pc:spChg>
+        <pc:spChg chg="mod">
+          <ac:chgData name="Kristofer Carta" userId="a949ead7c4bcd18f" providerId="LiveId" clId="{EE21B5BA-F702-4589-8258-402869B4781F}" dt="2017-08-22T10:19:24.738" v="1436" actId="20577"/>
+          <ac:spMkLst>
+            <pc:docMk/>
+            <pc:sldMk cId="3081455738" sldId="278"/>
+            <ac:spMk id="3" creationId="{343444A7-2703-48E0-9935-A7B1A3C1F912}"/>
+          </ac:spMkLst>
+        </pc:spChg>
+      </pc:sldChg>
+      <pc:sldChg chg="addSp delSp modSp add">
+        <pc:chgData name="Kristofer Carta" userId="a949ead7c4bcd18f" providerId="LiveId" clId="{EE21B5BA-F702-4589-8258-402869B4781F}" dt="2017-08-22T10:22:10.164" v="1448" actId="1038"/>
+        <pc:sldMkLst>
+          <pc:docMk/>
+          <pc:sldMk cId="533655295" sldId="279"/>
+        </pc:sldMkLst>
+        <pc:spChg chg="del">
+          <ac:chgData name="Kristofer Carta" userId="a949ead7c4bcd18f" providerId="LiveId" clId="{EE21B5BA-F702-4589-8258-402869B4781F}" dt="2017-08-22T10:21:26.072" v="1439" actId="478"/>
+          <ac:spMkLst>
+            <pc:docMk/>
+            <pc:sldMk cId="533655295" sldId="279"/>
+            <ac:spMk id="2" creationId="{1E583C6B-51FB-4F17-AFA4-07B3DF058419}"/>
+          </ac:spMkLst>
+        </pc:spChg>
+        <pc:spChg chg="del">
+          <ac:chgData name="Kristofer Carta" userId="a949ead7c4bcd18f" providerId="LiveId" clId="{EE21B5BA-F702-4589-8258-402869B4781F}" dt="2017-08-22T10:21:26.072" v="1439" actId="478"/>
+          <ac:spMkLst>
+            <pc:docMk/>
+            <pc:sldMk cId="533655295" sldId="279"/>
+            <ac:spMk id="3" creationId="{BA82E502-A005-47AB-B80F-A69BBE0038A8}"/>
+          </ac:spMkLst>
+        </pc:spChg>
+        <pc:spChg chg="add del">
+          <ac:chgData name="Kristofer Carta" userId="a949ead7c4bcd18f" providerId="LiveId" clId="{EE21B5BA-F702-4589-8258-402869B4781F}" dt="2017-08-22T10:21:27.127" v="1441" actId="1038"/>
+          <ac:spMkLst>
+            <pc:docMk/>
+            <pc:sldMk cId="533655295" sldId="279"/>
+            <ac:spMk id="4" creationId="{BEC984D1-E841-447D-94AE-06A6430DD207}"/>
+          </ac:spMkLst>
+        </pc:spChg>
+        <pc:picChg chg="add mod">
+          <ac:chgData name="Kristofer Carta" userId="a949ead7c4bcd18f" providerId="LiveId" clId="{EE21B5BA-F702-4589-8258-402869B4781F}" dt="2017-08-22T10:22:10.164" v="1448" actId="1038"/>
+          <ac:picMkLst>
+            <pc:docMk/>
+            <pc:sldMk cId="533655295" sldId="279"/>
+            <ac:picMk id="5" creationId="{B3215D08-2983-41DA-BED9-5D7B37090991}"/>
+          </ac:picMkLst>
+        </pc:picChg>
+      </pc:sldChg>
+    </pc:docChg>
+  </pc:docChgLst>
   <pc:docChgLst>
     <pc:chgData name="Kristofer Carta" userId="a949ead7c4bcd18f" providerId="LiveId" clId="{93888A2B-6F63-458A-BB21-CE9C4CE85A48}"/>
     <pc:docChg chg="undo redo custSel addSld delSld modSld sldOrd modSection">
@@ -4119,656 +4762,9 @@
     </pc:docChg>
   </pc:docChgLst>
   <pc:docChgLst>
-    <pc:chgData name="Kristofer Carta" userId="a949ead7c4bcd18f" providerId="LiveId" clId="{DC448491-B5B1-4C54-A7C5-1DD1B9C52ECE}"/>
-    <pc:docChg chg="undo custSel addSld modSld">
-      <pc:chgData name="Kristofer Carta" userId="a949ead7c4bcd18f" providerId="LiveId" clId="{DC448491-B5B1-4C54-A7C5-1DD1B9C52ECE}" dt="2017-08-21T20:28:02.885" v="1132" actId="20577"/>
-      <pc:docMkLst>
-        <pc:docMk/>
-      </pc:docMkLst>
-      <pc:sldChg chg="addSp delSp modSp add">
-        <pc:chgData name="Kristofer Carta" userId="a949ead7c4bcd18f" providerId="LiveId" clId="{DC448491-B5B1-4C54-A7C5-1DD1B9C52ECE}" dt="2017-08-21T20:22:07.315" v="611" actId="20577"/>
-        <pc:sldMkLst>
-          <pc:docMk/>
-          <pc:sldMk cId="258584565" sldId="272"/>
-        </pc:sldMkLst>
-        <pc:spChg chg="mod">
-          <ac:chgData name="Kristofer Carta" userId="a949ead7c4bcd18f" providerId="LiveId" clId="{DC448491-B5B1-4C54-A7C5-1DD1B9C52ECE}" dt="2017-08-21T20:17:44.736" v="36" actId="20577"/>
-          <ac:spMkLst>
-            <pc:docMk/>
-            <pc:sldMk cId="258584565" sldId="272"/>
-            <ac:spMk id="2" creationId="{26C127DD-EA79-4DA7-8B10-7DEE97CE2EAE}"/>
-          </ac:spMkLst>
-        </pc:spChg>
-        <pc:spChg chg="mod">
-          <ac:chgData name="Kristofer Carta" userId="a949ead7c4bcd18f" providerId="LiveId" clId="{DC448491-B5B1-4C54-A7C5-1DD1B9C52ECE}" dt="2017-08-21T20:22:07.315" v="611" actId="20577"/>
-          <ac:spMkLst>
-            <pc:docMk/>
-            <pc:sldMk cId="258584565" sldId="272"/>
-            <ac:spMk id="3" creationId="{D1B1226A-9863-424B-B2FF-DB7AD831C5A3}"/>
-          </ac:spMkLst>
-        </pc:spChg>
-        <pc:spChg chg="add del">
-          <ac:chgData name="Kristofer Carta" userId="a949ead7c4bcd18f" providerId="LiveId" clId="{DC448491-B5B1-4C54-A7C5-1DD1B9C52ECE}" dt="2017-08-21T20:17:48.523" v="38" actId="20577"/>
-          <ac:spMkLst>
-            <pc:docMk/>
-            <pc:sldMk cId="258584565" sldId="272"/>
-            <ac:spMk id="4" creationId="{49A086BC-9F08-4B1D-8D9A-0FDABF38D2CB}"/>
-          </ac:spMkLst>
-        </pc:spChg>
-      </pc:sldChg>
-      <pc:sldChg chg="modSp add">
-        <pc:chgData name="Kristofer Carta" userId="a949ead7c4bcd18f" providerId="LiveId" clId="{DC448491-B5B1-4C54-A7C5-1DD1B9C52ECE}" dt="2017-08-21T20:28:02.885" v="1132" actId="20577"/>
-        <pc:sldMkLst>
-          <pc:docMk/>
-          <pc:sldMk cId="2889338845" sldId="273"/>
-        </pc:sldMkLst>
-        <pc:spChg chg="mod">
-          <ac:chgData name="Kristofer Carta" userId="a949ead7c4bcd18f" providerId="LiveId" clId="{DC448491-B5B1-4C54-A7C5-1DD1B9C52ECE}" dt="2017-08-21T20:17:56.289" v="48" actId="20577"/>
-          <ac:spMkLst>
-            <pc:docMk/>
-            <pc:sldMk cId="2889338845" sldId="273"/>
-            <ac:spMk id="2" creationId="{26C127DD-EA79-4DA7-8B10-7DEE97CE2EAE}"/>
-          </ac:spMkLst>
-        </pc:spChg>
-        <pc:spChg chg="mod">
-          <ac:chgData name="Kristofer Carta" userId="a949ead7c4bcd18f" providerId="LiveId" clId="{DC448491-B5B1-4C54-A7C5-1DD1B9C52ECE}" dt="2017-08-21T20:28:02.885" v="1132" actId="20577"/>
-          <ac:spMkLst>
-            <pc:docMk/>
-            <pc:sldMk cId="2889338845" sldId="273"/>
-            <ac:spMk id="3" creationId="{D1B1226A-9863-424B-B2FF-DB7AD831C5A3}"/>
-          </ac:spMkLst>
-        </pc:spChg>
-      </pc:sldChg>
-    </pc:docChg>
-  </pc:docChgLst>
-  <pc:docChgLst>
-    <pc:chgData name="Kristofer Carta" userId="a949ead7c4bcd18f" providerId="LiveId" clId="{EE21B5BA-F702-4589-8258-402869B4781F}"/>
-    <pc:docChg chg="undo redo custSel addSld modSld sldOrd delSection">
-      <pc:chgData name="Kristofer Carta" userId="a949ead7c4bcd18f" providerId="LiveId" clId="{EE21B5BA-F702-4589-8258-402869B4781F}" dt="2017-08-22T10:23:23.672" v="1449" actId="1038"/>
-      <pc:docMkLst>
-        <pc:docMk/>
-      </pc:docMkLst>
-      <pc:sldChg chg="modSp">
-        <pc:chgData name="Kristofer Carta" userId="a949ead7c4bcd18f" providerId="LiveId" clId="{EE21B5BA-F702-4589-8258-402869B4781F}" dt="2017-08-22T10:23:23.672" v="1449" actId="1038"/>
-        <pc:sldMkLst>
-          <pc:docMk/>
-          <pc:sldMk cId="974364153" sldId="256"/>
-        </pc:sldMkLst>
-        <pc:spChg chg="mod">
-          <ac:chgData name="Kristofer Carta" userId="a949ead7c4bcd18f" providerId="LiveId" clId="{EE21B5BA-F702-4589-8258-402869B4781F}" dt="2017-08-22T10:23:23.672" v="1449" actId="1038"/>
-          <ac:spMkLst>
-            <pc:docMk/>
-            <pc:sldMk cId="974364153" sldId="256"/>
-            <ac:spMk id="3" creationId="{BB7D2EFF-91D1-4FCE-84B8-A7286782BC3D}"/>
-          </ac:spMkLst>
-        </pc:spChg>
-      </pc:sldChg>
-      <pc:sldChg chg="addSp delSp modSp delDesignElem">
-        <pc:chgData name="Kristofer Carta" userId="a949ead7c4bcd18f" providerId="LiveId" clId="{EE21B5BA-F702-4589-8258-402869B4781F}" dt="2017-08-21T21:02:38.352" v="371" actId="20577"/>
-        <pc:sldMkLst>
-          <pc:docMk/>
-          <pc:sldMk cId="3212783590" sldId="258"/>
-        </pc:sldMkLst>
-        <pc:spChg chg="mod">
-          <ac:chgData name="Kristofer Carta" userId="a949ead7c4bcd18f" providerId="LiveId" clId="{EE21B5BA-F702-4589-8258-402869B4781F}" dt="2017-08-21T21:02:38.352" v="371" actId="20577"/>
-          <ac:spMkLst>
-            <pc:docMk/>
-            <pc:sldMk cId="3212783590" sldId="258"/>
-            <ac:spMk id="3" creationId="{05F9B296-6FED-46D7-B938-C6029FE5AE22}"/>
-          </ac:spMkLst>
-        </pc:spChg>
-        <pc:spChg chg="add del">
-          <ac:chgData name="Kristofer Carta" userId="a949ead7c4bcd18f" providerId="LiveId" clId="{EE21B5BA-F702-4589-8258-402869B4781F}" dt="2017-08-21T20:57:24.235" v="162" actId="20577"/>
-          <ac:spMkLst>
-            <pc:docMk/>
-            <pc:sldMk cId="3212783590" sldId="258"/>
-            <ac:spMk id="12" creationId="{00000000-0000-0000-0000-000000000000}"/>
-          </ac:spMkLst>
-        </pc:spChg>
-      </pc:sldChg>
-      <pc:sldChg chg="addSp delSp ord delDesignElem">
-        <pc:chgData name="Kristofer Carta" userId="a949ead7c4bcd18f" providerId="LiveId" clId="{EE21B5BA-F702-4589-8258-402869B4781F}" dt="2017-08-21T21:03:15.676" v="380" actId="113"/>
-        <pc:sldMkLst>
-          <pc:docMk/>
-          <pc:sldMk cId="1871955869" sldId="259"/>
-        </pc:sldMkLst>
-        <pc:spChg chg="add del">
-          <ac:chgData name="Kristofer Carta" userId="a949ead7c4bcd18f" providerId="LiveId" clId="{EE21B5BA-F702-4589-8258-402869B4781F}" dt="2017-08-21T20:57:24.235" v="162" actId="113"/>
-          <ac:spMkLst>
-            <pc:docMk/>
-            <pc:sldMk cId="1871955869" sldId="259"/>
-            <ac:spMk id="85" creationId="{00000000-0000-0000-0000-000000000000}"/>
-          </ac:spMkLst>
-        </pc:spChg>
-        <pc:spChg chg="add del">
-          <ac:chgData name="Kristofer Carta" userId="a949ead7c4bcd18f" providerId="LiveId" clId="{EE21B5BA-F702-4589-8258-402869B4781F}" dt="2017-08-21T20:57:24.235" v="162" actId="113"/>
-          <ac:spMkLst>
-            <pc:docMk/>
-            <pc:sldMk cId="1871955869" sldId="259"/>
-            <ac:spMk id="1043" creationId="{00000000-0000-0000-0000-000000000000}"/>
-          </ac:spMkLst>
-        </pc:spChg>
-        <pc:cxnChg chg="add del">
-          <ac:chgData name="Kristofer Carta" userId="a949ead7c4bcd18f" providerId="LiveId" clId="{EE21B5BA-F702-4589-8258-402869B4781F}" dt="2017-08-21T20:57:24.235" v="162" actId="113"/>
-          <ac:cxnSpMkLst>
-            <pc:docMk/>
-            <pc:sldMk cId="1871955869" sldId="259"/>
-            <ac:cxnSpMk id="87" creationId="{00000000-0000-0000-0000-000000000000}"/>
-          </ac:cxnSpMkLst>
-        </pc:cxnChg>
-      </pc:sldChg>
-      <pc:sldChg chg="addSp delSp modSp delDesignElem">
-        <pc:chgData name="Kristofer Carta" userId="a949ead7c4bcd18f" providerId="LiveId" clId="{EE21B5BA-F702-4589-8258-402869B4781F}" dt="2017-08-21T21:14:10.899" v="493" actId="20577"/>
-        <pc:sldMkLst>
-          <pc:docMk/>
-          <pc:sldMk cId="3956988050" sldId="260"/>
-        </pc:sldMkLst>
-        <pc:spChg chg="mod">
-          <ac:chgData name="Kristofer Carta" userId="a949ead7c4bcd18f" providerId="LiveId" clId="{EE21B5BA-F702-4589-8258-402869B4781F}" dt="2017-08-21T21:14:10.899" v="493" actId="20577"/>
-          <ac:spMkLst>
-            <pc:docMk/>
-            <pc:sldMk cId="3956988050" sldId="260"/>
-            <ac:spMk id="3" creationId="{FFC353AD-FA04-47E2-BB20-54AD62996ABA}"/>
-          </ac:spMkLst>
-        </pc:spChg>
-        <pc:spChg chg="add del">
-          <ac:chgData name="Kristofer Carta" userId="a949ead7c4bcd18f" providerId="LiveId" clId="{EE21B5BA-F702-4589-8258-402869B4781F}" dt="2017-08-21T20:57:24.235" v="162" actId="113"/>
-          <ac:spMkLst>
-            <pc:docMk/>
-            <pc:sldMk cId="3956988050" sldId="260"/>
-            <ac:spMk id="27" creationId="{00000000-0000-0000-0000-000000000000}"/>
-          </ac:spMkLst>
-        </pc:spChg>
-        <pc:spChg chg="add del">
-          <ac:chgData name="Kristofer Carta" userId="a949ead7c4bcd18f" providerId="LiveId" clId="{EE21B5BA-F702-4589-8258-402869B4781F}" dt="2017-08-21T20:57:24.235" v="162" actId="113"/>
-          <ac:spMkLst>
-            <pc:docMk/>
-            <pc:sldMk cId="3956988050" sldId="260"/>
-            <ac:spMk id="28" creationId="{00000000-0000-0000-0000-000000000000}"/>
-          </ac:spMkLst>
-        </pc:spChg>
-      </pc:sldChg>
-      <pc:sldChg chg="addSp delSp modSp delDesignElem">
-        <pc:chgData name="Kristofer Carta" userId="a949ead7c4bcd18f" providerId="LiveId" clId="{EE21B5BA-F702-4589-8258-402869B4781F}" dt="2017-08-21T20:57:24.235" v="162" actId="113"/>
-        <pc:sldMkLst>
-          <pc:docMk/>
-          <pc:sldMk cId="1483780471" sldId="261"/>
-        </pc:sldMkLst>
-        <pc:spChg chg="mod">
-          <ac:chgData name="Kristofer Carta" userId="a949ead7c4bcd18f" providerId="LiveId" clId="{EE21B5BA-F702-4589-8258-402869B4781F}" dt="2017-08-21T20:54:21.327" v="118" actId="20577"/>
-          <ac:spMkLst>
-            <pc:docMk/>
-            <pc:sldMk cId="1483780471" sldId="261"/>
-            <ac:spMk id="3" creationId="{B6466418-089E-4177-8FBC-1155E9BB8870}"/>
-          </ac:spMkLst>
-        </pc:spChg>
-        <pc:spChg chg="add del">
-          <ac:chgData name="Kristofer Carta" userId="a949ead7c4bcd18f" providerId="LiveId" clId="{EE21B5BA-F702-4589-8258-402869B4781F}" dt="2017-08-21T20:57:24.235" v="162" actId="113"/>
-          <ac:spMkLst>
-            <pc:docMk/>
-            <pc:sldMk cId="1483780471" sldId="261"/>
-            <ac:spMk id="71" creationId="{00000000-0000-0000-0000-000000000000}"/>
-          </ac:spMkLst>
-        </pc:spChg>
-      </pc:sldChg>
-      <pc:sldChg chg="addSp delSp modSp mod setBg setClrOvrMap">
-        <pc:chgData name="Kristofer Carta" userId="a949ead7c4bcd18f" providerId="LiveId" clId="{EE21B5BA-F702-4589-8258-402869B4781F}" dt="2017-08-21T20:59:44.640" v="251" actId="113"/>
-        <pc:sldMkLst>
-          <pc:docMk/>
-          <pc:sldMk cId="2700095255" sldId="265"/>
-        </pc:sldMkLst>
-        <pc:spChg chg="mod">
-          <ac:chgData name="Kristofer Carta" userId="a949ead7c4bcd18f" providerId="LiveId" clId="{EE21B5BA-F702-4589-8258-402869B4781F}" dt="2017-08-21T20:57:16.726" v="154" actId="1076"/>
-          <ac:spMkLst>
-            <pc:docMk/>
-            <pc:sldMk cId="2700095255" sldId="265"/>
-            <ac:spMk id="2" creationId="{B25C8939-68B1-4966-B6F0-0CB9790784DD}"/>
-          </ac:spMkLst>
-        </pc:spChg>
-        <pc:spChg chg="add del mod">
-          <ac:chgData name="Kristofer Carta" userId="a949ead7c4bcd18f" providerId="LiveId" clId="{EE21B5BA-F702-4589-8258-402869B4781F}" dt="2017-08-21T20:59:44.640" v="251" actId="113"/>
-          <ac:spMkLst>
-            <pc:docMk/>
-            <pc:sldMk cId="2700095255" sldId="265"/>
-            <ac:spMk id="3" creationId="{9DB25D54-DF59-4420-A50E-BCB89C484DB5}"/>
-          </ac:spMkLst>
-        </pc:spChg>
-        <pc:spChg chg="add del">
-          <ac:chgData name="Kristofer Carta" userId="a949ead7c4bcd18f" providerId="LiveId" clId="{EE21B5BA-F702-4589-8258-402869B4781F}" dt="2017-08-21T20:57:03.379" v="146" actId="26606"/>
-          <ac:spMkLst>
-            <pc:docMk/>
-            <pc:sldMk cId="2700095255" sldId="265"/>
-            <ac:spMk id="6" creationId="{00000000-0000-0000-0000-000000000000}"/>
-          </ac:spMkLst>
-        </pc:spChg>
-        <pc:spChg chg="add del">
-          <ac:chgData name="Kristofer Carta" userId="a949ead7c4bcd18f" providerId="LiveId" clId="{EE21B5BA-F702-4589-8258-402869B4781F}" dt="2017-08-21T20:57:07.026" v="148" actId="26606"/>
-          <ac:spMkLst>
-            <pc:docMk/>
-            <pc:sldMk cId="2700095255" sldId="265"/>
-            <ac:spMk id="9" creationId="{00000000-0000-0000-0000-000000000000}"/>
-          </ac:spMkLst>
-        </pc:spChg>
-        <pc:spChg chg="add del">
-          <ac:chgData name="Kristofer Carta" userId="a949ead7c4bcd18f" providerId="LiveId" clId="{EE21B5BA-F702-4589-8258-402869B4781F}" dt="2017-08-21T20:56:05.823" v="133" actId="26606"/>
-          <ac:spMkLst>
-            <pc:docMk/>
-            <pc:sldMk cId="2700095255" sldId="265"/>
-            <ac:spMk id="10" creationId="{00000000-0000-0000-0000-000000000000}"/>
-          </ac:spMkLst>
-        </pc:spChg>
-        <pc:spChg chg="add del">
-          <ac:chgData name="Kristofer Carta" userId="a949ead7c4bcd18f" providerId="LiveId" clId="{EE21B5BA-F702-4589-8258-402869B4781F}" dt="2017-08-21T20:56:09.995" v="135" actId="26606"/>
-          <ac:spMkLst>
-            <pc:docMk/>
-            <pc:sldMk cId="2700095255" sldId="265"/>
-            <ac:spMk id="12" creationId="{00000000-0000-0000-0000-000000000000}"/>
-          </ac:spMkLst>
-        </pc:spChg>
-        <pc:spChg chg="add del">
-          <ac:chgData name="Kristofer Carta" userId="a949ead7c4bcd18f" providerId="LiveId" clId="{EE21B5BA-F702-4589-8258-402869B4781F}" dt="2017-08-21T20:56:09.995" v="135" actId="26606"/>
-          <ac:spMkLst>
-            <pc:docMk/>
-            <pc:sldMk cId="2700095255" sldId="265"/>
-            <ac:spMk id="13" creationId="{00000000-0000-0000-0000-000000000000}"/>
-          </ac:spMkLst>
-        </pc:spChg>
-        <pc:spChg chg="add del">
-          <ac:chgData name="Kristofer Carta" userId="a949ead7c4bcd18f" providerId="LiveId" clId="{EE21B5BA-F702-4589-8258-402869B4781F}" dt="2017-08-21T20:56:12.869" v="139" actId="26606"/>
-          <ac:spMkLst>
-            <pc:docMk/>
-            <pc:sldMk cId="2700095255" sldId="265"/>
-            <ac:spMk id="18" creationId="{00000000-0000-0000-0000-000000000000}"/>
-          </ac:spMkLst>
-        </pc:spChg>
-        <pc:spChg chg="add del">
-          <ac:chgData name="Kristofer Carta" userId="a949ead7c4bcd18f" providerId="LiveId" clId="{EE21B5BA-F702-4589-8258-402869B4781F}" dt="2017-08-21T20:56:12.869" v="139" actId="26606"/>
-          <ac:spMkLst>
-            <pc:docMk/>
-            <pc:sldMk cId="2700095255" sldId="265"/>
-            <ac:spMk id="19" creationId="{00000000-0000-0000-0000-000000000000}"/>
-          </ac:spMkLst>
-        </pc:spChg>
-        <pc:spChg chg="add del">
-          <ac:chgData name="Kristofer Carta" userId="a949ead7c4bcd18f" providerId="LiveId" clId="{EE21B5BA-F702-4589-8258-402869B4781F}" dt="2017-08-21T20:56:12.869" v="139" actId="26606"/>
-          <ac:spMkLst>
-            <pc:docMk/>
-            <pc:sldMk cId="2700095255" sldId="265"/>
-            <ac:spMk id="20" creationId="{00000000-0000-0000-0000-000000000000}"/>
-          </ac:spMkLst>
-        </pc:spChg>
-        <pc:graphicFrameChg chg="add del">
-          <ac:chgData name="Kristofer Carta" userId="a949ead7c4bcd18f" providerId="LiveId" clId="{EE21B5BA-F702-4589-8258-402869B4781F}" dt="2017-08-21T20:56:05.823" v="133" actId="26606"/>
-          <ac:graphicFrameMkLst>
-            <pc:docMk/>
-            <pc:sldMk cId="2700095255" sldId="265"/>
-            <ac:graphicFrameMk id="5" creationId="{00000000-0000-0000-0000-000000000000}"/>
-          </ac:graphicFrameMkLst>
-        </pc:graphicFrameChg>
-        <pc:graphicFrameChg chg="add del">
-          <ac:chgData name="Kristofer Carta" userId="a949ead7c4bcd18f" providerId="LiveId" clId="{EE21B5BA-F702-4589-8258-402869B4781F}" dt="2017-08-21T20:57:03.379" v="146" actId="26606"/>
-          <ac:graphicFrameMkLst>
-            <pc:docMk/>
-            <pc:sldMk cId="2700095255" sldId="265"/>
-            <ac:graphicFrameMk id="7" creationId="{00000000-0000-0000-0000-000000000000}"/>
-          </ac:graphicFrameMkLst>
-        </pc:graphicFrameChg>
-        <pc:graphicFrameChg chg="add del">
-          <ac:chgData name="Kristofer Carta" userId="a949ead7c4bcd18f" providerId="LiveId" clId="{EE21B5BA-F702-4589-8258-402869B4781F}" dt="2017-08-21T20:56:09.995" v="135" actId="26606"/>
-          <ac:graphicFrameMkLst>
-            <pc:docMk/>
-            <pc:sldMk cId="2700095255" sldId="265"/>
-            <ac:graphicFrameMk id="14" creationId="{00000000-0000-0000-0000-000000000000}"/>
-          </ac:graphicFrameMkLst>
-        </pc:graphicFrameChg>
-        <pc:graphicFrameChg chg="add del">
-          <ac:chgData name="Kristofer Carta" userId="a949ead7c4bcd18f" providerId="LiveId" clId="{EE21B5BA-F702-4589-8258-402869B4781F}" dt="2017-08-21T20:57:07.026" v="148" actId="26606"/>
-          <ac:graphicFrameMkLst>
-            <pc:docMk/>
-            <pc:sldMk cId="2700095255" sldId="265"/>
-            <ac:graphicFrameMk id="15" creationId="{00000000-0000-0000-0000-000000000000}"/>
-          </ac:graphicFrameMkLst>
-        </pc:graphicFrameChg>
-        <pc:graphicFrameChg chg="add del">
-          <ac:chgData name="Kristofer Carta" userId="a949ead7c4bcd18f" providerId="LiveId" clId="{EE21B5BA-F702-4589-8258-402869B4781F}" dt="2017-08-21T20:56:11.920" v="137" actId="26606"/>
-          <ac:graphicFrameMkLst>
-            <pc:docMk/>
-            <pc:sldMk cId="2700095255" sldId="265"/>
-            <ac:graphicFrameMk id="16" creationId="{00000000-0000-0000-0000-000000000000}"/>
-          </ac:graphicFrameMkLst>
-        </pc:graphicFrameChg>
-        <pc:graphicFrameChg chg="add del">
-          <ac:chgData name="Kristofer Carta" userId="a949ead7c4bcd18f" providerId="LiveId" clId="{EE21B5BA-F702-4589-8258-402869B4781F}" dt="2017-08-21T20:57:09.354" v="150" actId="26606"/>
-          <ac:graphicFrameMkLst>
-            <pc:docMk/>
-            <pc:sldMk cId="2700095255" sldId="265"/>
-            <ac:graphicFrameMk id="17" creationId="{00000000-0000-0000-0000-000000000000}"/>
-          </ac:graphicFrameMkLst>
-        </pc:graphicFrameChg>
-        <pc:graphicFrameChg chg="add del">
-          <ac:chgData name="Kristofer Carta" userId="a949ead7c4bcd18f" providerId="LiveId" clId="{EE21B5BA-F702-4589-8258-402869B4781F}" dt="2017-08-21T20:56:12.869" v="139" actId="26606"/>
-          <ac:graphicFrameMkLst>
-            <pc:docMk/>
-            <pc:sldMk cId="2700095255" sldId="265"/>
-            <ac:graphicFrameMk id="21" creationId="{00000000-0000-0000-0000-000000000000}"/>
-          </ac:graphicFrameMkLst>
-        </pc:graphicFrameChg>
-        <pc:cxnChg chg="add del">
-          <ac:chgData name="Kristofer Carta" userId="a949ead7c4bcd18f" providerId="LiveId" clId="{EE21B5BA-F702-4589-8258-402869B4781F}" dt="2017-08-21T20:57:07.026" v="148" actId="26606"/>
-          <ac:cxnSpMkLst>
-            <pc:docMk/>
-            <pc:sldMk cId="2700095255" sldId="265"/>
-            <ac:cxnSpMk id="11" creationId="{00000000-0000-0000-0000-000000000000}"/>
-          </ac:cxnSpMkLst>
-        </pc:cxnChg>
-      </pc:sldChg>
-      <pc:sldChg chg="addSp delSp modSp ord">
-        <pc:chgData name="Kristofer Carta" userId="a949ead7c4bcd18f" providerId="LiveId" clId="{EE21B5BA-F702-4589-8258-402869B4781F}" dt="2017-08-21T20:59:53.977" v="259" actId="20577"/>
-        <pc:sldMkLst>
-          <pc:docMk/>
-          <pc:sldMk cId="2413704392" sldId="266"/>
-        </pc:sldMkLst>
-        <pc:spChg chg="mod">
-          <ac:chgData name="Kristofer Carta" userId="a949ead7c4bcd18f" providerId="LiveId" clId="{EE21B5BA-F702-4589-8258-402869B4781F}" dt="2017-08-21T20:58:04.416" v="203" actId="26606"/>
-          <ac:spMkLst>
-            <pc:docMk/>
-            <pc:sldMk cId="2413704392" sldId="266"/>
-            <ac:spMk id="2" creationId="{F988F3E1-779C-4B9E-97FD-01A1B9A3A1CD}"/>
-          </ac:spMkLst>
-        </pc:spChg>
-        <pc:spChg chg="mod">
-          <ac:chgData name="Kristofer Carta" userId="a949ead7c4bcd18f" providerId="LiveId" clId="{EE21B5BA-F702-4589-8258-402869B4781F}" dt="2017-08-21T20:59:53.977" v="259" actId="20577"/>
-          <ac:spMkLst>
-            <pc:docMk/>
-            <pc:sldMk cId="2413704392" sldId="266"/>
-            <ac:spMk id="3" creationId="{67A1AF6A-2F04-4A37-B5E2-0DB309813C9A}"/>
-          </ac:spMkLst>
-        </pc:spChg>
-        <pc:spChg chg="add del">
-          <ac:chgData name="Kristofer Carta" userId="a949ead7c4bcd18f" providerId="LiveId" clId="{EE21B5BA-F702-4589-8258-402869B4781F}" dt="2017-08-21T20:58:04.416" v="203" actId="26606"/>
-          <ac:spMkLst>
-            <pc:docMk/>
-            <pc:sldMk cId="2413704392" sldId="266"/>
-            <ac:spMk id="8" creationId="{00000000-0000-0000-0000-000000000000}"/>
-          </ac:spMkLst>
-        </pc:spChg>
-      </pc:sldChg>
-      <pc:sldChg chg="addSp delSp delDesignElem">
-        <pc:chgData name="Kristofer Carta" userId="a949ead7c4bcd18f" providerId="LiveId" clId="{EE21B5BA-F702-4589-8258-402869B4781F}" dt="2017-08-21T20:57:24.235" v="162" actId="113"/>
-        <pc:sldMkLst>
-          <pc:docMk/>
-          <pc:sldMk cId="2886054059" sldId="268"/>
-        </pc:sldMkLst>
-        <pc:spChg chg="add del">
-          <ac:chgData name="Kristofer Carta" userId="a949ead7c4bcd18f" providerId="LiveId" clId="{EE21B5BA-F702-4589-8258-402869B4781F}" dt="2017-08-21T20:57:24.235" v="162" actId="113"/>
-          <ac:spMkLst>
-            <pc:docMk/>
-            <pc:sldMk cId="2886054059" sldId="268"/>
-            <ac:spMk id="8" creationId="{00000000-0000-0000-0000-000000000000}"/>
-          </ac:spMkLst>
-        </pc:spChg>
-      </pc:sldChg>
-      <pc:sldChg chg="addSp delSp delDesignElem">
-        <pc:chgData name="Kristofer Carta" userId="a949ead7c4bcd18f" providerId="LiveId" clId="{EE21B5BA-F702-4589-8258-402869B4781F}" dt="2017-08-21T20:57:24.235" v="162" actId="113"/>
-        <pc:sldMkLst>
-          <pc:docMk/>
-          <pc:sldMk cId="1087171556" sldId="269"/>
-        </pc:sldMkLst>
-        <pc:spChg chg="add del">
-          <ac:chgData name="Kristofer Carta" userId="a949ead7c4bcd18f" providerId="LiveId" clId="{EE21B5BA-F702-4589-8258-402869B4781F}" dt="2017-08-21T20:57:24.235" v="162" actId="113"/>
-          <ac:spMkLst>
-            <pc:docMk/>
-            <pc:sldMk cId="1087171556" sldId="269"/>
-            <ac:spMk id="8" creationId="{00000000-0000-0000-0000-000000000000}"/>
-          </ac:spMkLst>
-        </pc:spChg>
-      </pc:sldChg>
-      <pc:sldChg chg="addSp delSp modSp mod setBg setClrOvrMap">
-        <pc:chgData name="Kristofer Carta" userId="a949ead7c4bcd18f" providerId="LiveId" clId="{EE21B5BA-F702-4589-8258-402869B4781F}" dt="2017-08-21T21:04:47.605" v="394" actId="20577"/>
-        <pc:sldMkLst>
-          <pc:docMk/>
-          <pc:sldMk cId="2783061044" sldId="271"/>
-        </pc:sldMkLst>
-        <pc:spChg chg="mod">
-          <ac:chgData name="Kristofer Carta" userId="a949ead7c4bcd18f" providerId="LiveId" clId="{EE21B5BA-F702-4589-8258-402869B4781F}" dt="2017-08-21T21:03:41.934" v="384" actId="26606"/>
-          <ac:spMkLst>
-            <pc:docMk/>
-            <pc:sldMk cId="2783061044" sldId="271"/>
-            <ac:spMk id="2" creationId="{682FA6FE-49AC-4D37-B270-E527DFCE236A}"/>
-          </ac:spMkLst>
-        </pc:spChg>
-        <pc:spChg chg="mod">
-          <ac:chgData name="Kristofer Carta" userId="a949ead7c4bcd18f" providerId="LiveId" clId="{EE21B5BA-F702-4589-8258-402869B4781F}" dt="2017-08-21T21:04:47.605" v="394" actId="20577"/>
-          <ac:spMkLst>
-            <pc:docMk/>
-            <pc:sldMk cId="2783061044" sldId="271"/>
-            <ac:spMk id="3" creationId="{CB5CF5F7-55FD-40B2-8557-A3B9DF5E60B1}"/>
-          </ac:spMkLst>
-        </pc:spChg>
-        <pc:spChg chg="add del">
-          <ac:chgData name="Kristofer Carta" userId="a949ead7c4bcd18f" providerId="LiveId" clId="{EE21B5BA-F702-4589-8258-402869B4781F}" dt="2017-08-21T21:03:41.929" v="383" actId="26606"/>
-          <ac:spMkLst>
-            <pc:docMk/>
-            <pc:sldMk cId="2783061044" sldId="271"/>
-            <ac:spMk id="8" creationId="{00000000-0000-0000-0000-000000000000}"/>
-          </ac:spMkLst>
-        </pc:spChg>
-        <pc:spChg chg="add">
-          <ac:chgData name="Kristofer Carta" userId="a949ead7c4bcd18f" providerId="LiveId" clId="{EE21B5BA-F702-4589-8258-402869B4781F}" dt="2017-08-21T21:03:41.934" v="384" actId="26606"/>
-          <ac:spMkLst>
-            <pc:docMk/>
-            <pc:sldMk cId="2783061044" sldId="271"/>
-            <ac:spMk id="12" creationId="{00000000-0000-0000-0000-000000000000}"/>
-          </ac:spMkLst>
-        </pc:spChg>
-        <pc:spChg chg="add">
-          <ac:chgData name="Kristofer Carta" userId="a949ead7c4bcd18f" providerId="LiveId" clId="{EE21B5BA-F702-4589-8258-402869B4781F}" dt="2017-08-21T21:03:41.934" v="384" actId="26606"/>
-          <ac:spMkLst>
-            <pc:docMk/>
-            <pc:sldMk cId="2783061044" sldId="271"/>
-            <ac:spMk id="13" creationId="{00000000-0000-0000-0000-000000000000}"/>
-          </ac:spMkLst>
-        </pc:spChg>
-        <pc:spChg chg="add">
-          <ac:chgData name="Kristofer Carta" userId="a949ead7c4bcd18f" providerId="LiveId" clId="{EE21B5BA-F702-4589-8258-402869B4781F}" dt="2017-08-21T21:03:41.934" v="384" actId="26606"/>
-          <ac:spMkLst>
-            <pc:docMk/>
-            <pc:sldMk cId="2783061044" sldId="271"/>
-            <ac:spMk id="14" creationId="{00000000-0000-0000-0000-000000000000}"/>
-          </ac:spMkLst>
-        </pc:spChg>
-        <pc:cxnChg chg="add del">
-          <ac:chgData name="Kristofer Carta" userId="a949ead7c4bcd18f" providerId="LiveId" clId="{EE21B5BA-F702-4589-8258-402869B4781F}" dt="2017-08-21T21:03:41.929" v="383" actId="26606"/>
-          <ac:cxnSpMkLst>
-            <pc:docMk/>
-            <pc:sldMk cId="2783061044" sldId="271"/>
-            <ac:cxnSpMk id="10" creationId="{00000000-0000-0000-0000-000000000000}"/>
-          </ac:cxnSpMkLst>
-        </pc:cxnChg>
-      </pc:sldChg>
-      <pc:sldChg chg="modSp">
-        <pc:chgData name="Kristofer Carta" userId="a949ead7c4bcd18f" providerId="LiveId" clId="{EE21B5BA-F702-4589-8258-402869B4781F}" dt="2017-08-21T21:06:10.031" v="451" actId="113"/>
-        <pc:sldMkLst>
-          <pc:docMk/>
-          <pc:sldMk cId="258584565" sldId="272"/>
-        </pc:sldMkLst>
-        <pc:spChg chg="mod">
-          <ac:chgData name="Kristofer Carta" userId="a949ead7c4bcd18f" providerId="LiveId" clId="{EE21B5BA-F702-4589-8258-402869B4781F}" dt="2017-08-21T21:06:10.031" v="451" actId="113"/>
-          <ac:spMkLst>
-            <pc:docMk/>
-            <pc:sldMk cId="258584565" sldId="272"/>
-            <ac:spMk id="3" creationId="{D1B1226A-9863-424B-B2FF-DB7AD831C5A3}"/>
-          </ac:spMkLst>
-        </pc:spChg>
-      </pc:sldChg>
-      <pc:sldChg chg="addSp modSp add mod setBg setClrOvrMap">
-        <pc:chgData name="Kristofer Carta" userId="a949ead7c4bcd18f" providerId="LiveId" clId="{EE21B5BA-F702-4589-8258-402869B4781F}" dt="2017-08-21T21:23:13.376" v="739" actId="1076"/>
-        <pc:sldMkLst>
-          <pc:docMk/>
-          <pc:sldMk cId="371282952" sldId="274"/>
-        </pc:sldMkLst>
-        <pc:spChg chg="mod">
-          <ac:chgData name="Kristofer Carta" userId="a949ead7c4bcd18f" providerId="LiveId" clId="{EE21B5BA-F702-4589-8258-402869B4781F}" dt="2017-08-21T21:22:25.797" v="687" actId="26606"/>
-          <ac:spMkLst>
-            <pc:docMk/>
-            <pc:sldMk cId="371282952" sldId="274"/>
-            <ac:spMk id="2" creationId="{BBC4660B-A003-40EA-91DF-E29FCA70ED31}"/>
-          </ac:spMkLst>
-        </pc:spChg>
-        <pc:spChg chg="mod">
-          <ac:chgData name="Kristofer Carta" userId="a949ead7c4bcd18f" providerId="LiveId" clId="{EE21B5BA-F702-4589-8258-402869B4781F}" dt="2017-08-21T21:23:13.376" v="739" actId="1076"/>
-          <ac:spMkLst>
-            <pc:docMk/>
-            <pc:sldMk cId="371282952" sldId="274"/>
-            <ac:spMk id="3" creationId="{CFC9B3E3-1F8E-457A-8A5F-8C16303A7DF9}"/>
-          </ac:spMkLst>
-        </pc:spChg>
-        <pc:spChg chg="add">
-          <ac:chgData name="Kristofer Carta" userId="a949ead7c4bcd18f" providerId="LiveId" clId="{EE21B5BA-F702-4589-8258-402869B4781F}" dt="2017-08-21T21:22:25.797" v="687" actId="26606"/>
-          <ac:spMkLst>
-            <pc:docMk/>
-            <pc:sldMk cId="371282952" sldId="274"/>
-            <ac:spMk id="8" creationId="{00000000-0000-0000-0000-000000000000}"/>
-          </ac:spMkLst>
-        </pc:spChg>
-        <pc:spChg chg="add">
-          <ac:chgData name="Kristofer Carta" userId="a949ead7c4bcd18f" providerId="LiveId" clId="{EE21B5BA-F702-4589-8258-402869B4781F}" dt="2017-08-21T21:22:25.797" v="687" actId="26606"/>
-          <ac:spMkLst>
-            <pc:docMk/>
-            <pc:sldMk cId="371282952" sldId="274"/>
-            <ac:spMk id="10" creationId="{00000000-0000-0000-0000-000000000000}"/>
-          </ac:spMkLst>
-        </pc:spChg>
-        <pc:spChg chg="add">
-          <ac:chgData name="Kristofer Carta" userId="a949ead7c4bcd18f" providerId="LiveId" clId="{EE21B5BA-F702-4589-8258-402869B4781F}" dt="2017-08-21T21:22:25.797" v="687" actId="26606"/>
-          <ac:spMkLst>
-            <pc:docMk/>
-            <pc:sldMk cId="371282952" sldId="274"/>
-            <ac:spMk id="12" creationId="{00000000-0000-0000-0000-000000000000}"/>
-          </ac:spMkLst>
-        </pc:spChg>
-      </pc:sldChg>
-      <pc:sldChg chg="modSp add">
-        <pc:chgData name="Kristofer Carta" userId="a949ead7c4bcd18f" providerId="LiveId" clId="{EE21B5BA-F702-4589-8258-402869B4781F}" dt="2017-08-21T21:32:09.200" v="1340" actId="20577"/>
-        <pc:sldMkLst>
-          <pc:docMk/>
-          <pc:sldMk cId="311738350" sldId="275"/>
-        </pc:sldMkLst>
-        <pc:spChg chg="mod">
-          <ac:chgData name="Kristofer Carta" userId="a949ead7c4bcd18f" providerId="LiveId" clId="{EE21B5BA-F702-4589-8258-402869B4781F}" dt="2017-08-21T21:25:24.680" v="758" actId="20577"/>
-          <ac:spMkLst>
-            <pc:docMk/>
-            <pc:sldMk cId="311738350" sldId="275"/>
-            <ac:spMk id="2" creationId="{50813FC1-0B5C-4E30-980E-03F1557788AA}"/>
-          </ac:spMkLst>
-        </pc:spChg>
-        <pc:spChg chg="mod">
-          <ac:chgData name="Kristofer Carta" userId="a949ead7c4bcd18f" providerId="LiveId" clId="{EE21B5BA-F702-4589-8258-402869B4781F}" dt="2017-08-21T21:32:09.200" v="1340" actId="20577"/>
-          <ac:spMkLst>
-            <pc:docMk/>
-            <pc:sldMk cId="311738350" sldId="275"/>
-            <ac:spMk id="3" creationId="{AADA4A45-4FE9-4FC7-A116-BAF06F399409}"/>
-          </ac:spMkLst>
-        </pc:spChg>
-      </pc:sldChg>
-      <pc:sldChg chg="delSp modSp add">
-        <pc:chgData name="Kristofer Carta" userId="a949ead7c4bcd18f" providerId="LiveId" clId="{EE21B5BA-F702-4589-8258-402869B4781F}" dt="2017-08-21T21:23:47.781" v="749" actId="478"/>
-        <pc:sldMkLst>
-          <pc:docMk/>
-          <pc:sldMk cId="2245622187" sldId="276"/>
-        </pc:sldMkLst>
-        <pc:spChg chg="mod">
-          <ac:chgData name="Kristofer Carta" userId="a949ead7c4bcd18f" providerId="LiveId" clId="{EE21B5BA-F702-4589-8258-402869B4781F}" dt="2017-08-21T21:23:43.290" v="747" actId="20577"/>
-          <ac:spMkLst>
-            <pc:docMk/>
-            <pc:sldMk cId="2245622187" sldId="276"/>
-            <ac:spMk id="2" creationId="{1F1EF97D-66EF-4DCF-9EFF-EA639C490522}"/>
-          </ac:spMkLst>
-        </pc:spChg>
-        <pc:spChg chg="del mod">
-          <ac:chgData name="Kristofer Carta" userId="a949ead7c4bcd18f" providerId="LiveId" clId="{EE21B5BA-F702-4589-8258-402869B4781F}" dt="2017-08-21T21:23:47.781" v="749" actId="478"/>
-          <ac:spMkLst>
-            <pc:docMk/>
-            <pc:sldMk cId="2245622187" sldId="276"/>
-            <ac:spMk id="3" creationId="{807A7C8B-32C2-4824-820A-ED9AC9BA50A6}"/>
-          </ac:spMkLst>
-        </pc:spChg>
-      </pc:sldChg>
-      <pc:sldChg chg="add">
-        <pc:chgData name="Kristofer Carta" userId="a949ead7c4bcd18f" providerId="LiveId" clId="{EE21B5BA-F702-4589-8258-402869B4781F}" dt="2017-08-21T21:23:57.613" v="750" actId="20577"/>
-        <pc:sldMkLst>
-          <pc:docMk/>
-          <pc:sldMk cId="597761154" sldId="277"/>
-        </pc:sldMkLst>
-      </pc:sldChg>
-      <pc:sldChg chg="modSp add">
-        <pc:chgData name="Kristofer Carta" userId="a949ead7c4bcd18f" providerId="LiveId" clId="{EE21B5BA-F702-4589-8258-402869B4781F}" dt="2017-08-22T10:19:24.738" v="1436" actId="20577"/>
-        <pc:sldMkLst>
-          <pc:docMk/>
-          <pc:sldMk cId="3081455738" sldId="278"/>
-        </pc:sldMkLst>
-        <pc:spChg chg="mod">
-          <ac:chgData name="Kristofer Carta" userId="a949ead7c4bcd18f" providerId="LiveId" clId="{EE21B5BA-F702-4589-8258-402869B4781F}" dt="2017-08-21T21:29:27.794" v="1084" actId="20577"/>
-          <ac:spMkLst>
-            <pc:docMk/>
-            <pc:sldMk cId="3081455738" sldId="278"/>
-            <ac:spMk id="2" creationId="{68F475E6-7D37-468D-9AF2-FD15D95A9545}"/>
-          </ac:spMkLst>
-        </pc:spChg>
-        <pc:spChg chg="mod">
-          <ac:chgData name="Kristofer Carta" userId="a949ead7c4bcd18f" providerId="LiveId" clId="{EE21B5BA-F702-4589-8258-402869B4781F}" dt="2017-08-22T10:19:24.738" v="1436" actId="20577"/>
-          <ac:spMkLst>
-            <pc:docMk/>
-            <pc:sldMk cId="3081455738" sldId="278"/>
-            <ac:spMk id="3" creationId="{343444A7-2703-48E0-9935-A7B1A3C1F912}"/>
-          </ac:spMkLst>
-        </pc:spChg>
-      </pc:sldChg>
-      <pc:sldChg chg="addSp delSp modSp add">
-        <pc:chgData name="Kristofer Carta" userId="a949ead7c4bcd18f" providerId="LiveId" clId="{EE21B5BA-F702-4589-8258-402869B4781F}" dt="2017-08-22T10:22:10.164" v="1448" actId="1038"/>
-        <pc:sldMkLst>
-          <pc:docMk/>
-          <pc:sldMk cId="533655295" sldId="279"/>
-        </pc:sldMkLst>
-        <pc:spChg chg="del">
-          <ac:chgData name="Kristofer Carta" userId="a949ead7c4bcd18f" providerId="LiveId" clId="{EE21B5BA-F702-4589-8258-402869B4781F}" dt="2017-08-22T10:21:26.072" v="1439" actId="478"/>
-          <ac:spMkLst>
-            <pc:docMk/>
-            <pc:sldMk cId="533655295" sldId="279"/>
-            <ac:spMk id="2" creationId="{1E583C6B-51FB-4F17-AFA4-07B3DF058419}"/>
-          </ac:spMkLst>
-        </pc:spChg>
-        <pc:spChg chg="del">
-          <ac:chgData name="Kristofer Carta" userId="a949ead7c4bcd18f" providerId="LiveId" clId="{EE21B5BA-F702-4589-8258-402869B4781F}" dt="2017-08-22T10:21:26.072" v="1439" actId="478"/>
-          <ac:spMkLst>
-            <pc:docMk/>
-            <pc:sldMk cId="533655295" sldId="279"/>
-            <ac:spMk id="3" creationId="{BA82E502-A005-47AB-B80F-A69BBE0038A8}"/>
-          </ac:spMkLst>
-        </pc:spChg>
-        <pc:spChg chg="add del">
-          <ac:chgData name="Kristofer Carta" userId="a949ead7c4bcd18f" providerId="LiveId" clId="{EE21B5BA-F702-4589-8258-402869B4781F}" dt="2017-08-22T10:21:27.127" v="1441" actId="1038"/>
-          <ac:spMkLst>
-            <pc:docMk/>
-            <pc:sldMk cId="533655295" sldId="279"/>
-            <ac:spMk id="4" creationId="{BEC984D1-E841-447D-94AE-06A6430DD207}"/>
-          </ac:spMkLst>
-        </pc:spChg>
-        <pc:picChg chg="add mod">
-          <ac:chgData name="Kristofer Carta" userId="a949ead7c4bcd18f" providerId="LiveId" clId="{EE21B5BA-F702-4589-8258-402869B4781F}" dt="2017-08-22T10:22:10.164" v="1448" actId="1038"/>
-          <ac:picMkLst>
-            <pc:docMk/>
-            <pc:sldMk cId="533655295" sldId="279"/>
-            <ac:picMk id="5" creationId="{B3215D08-2983-41DA-BED9-5D7B37090991}"/>
-          </ac:picMkLst>
-        </pc:picChg>
-      </pc:sldChg>
-    </pc:docChg>
-  </pc:docChgLst>
-  <pc:docChgLst>
     <pc:chgData name="Kristofer Carta" userId="a949ead7c4bcd18f" providerId="LiveId" clId="{8B1725E7-4F78-4438-A95B-BD3CF9EE89A5}"/>
     <pc:docChg chg="undo redo custSel addSld delSld modSld sldOrd modSection">
-      <pc:chgData name="Kristofer Carta" userId="a949ead7c4bcd18f" providerId="LiveId" clId="{8B1725E7-4F78-4438-A95B-BD3CF9EE89A5}" dt="2017-08-31T08:43:42.206" v="17216" actId="20577"/>
+      <pc:chgData name="Kristofer Carta" userId="a949ead7c4bcd18f" providerId="LiveId" clId="{8B1725E7-4F78-4438-A95B-BD3CF9EE89A5}" dt="2017-08-31T10:22:16.760" v="17278" actId="20577"/>
       <pc:docMkLst>
         <pc:docMk/>
       </pc:docMkLst>
@@ -6143,6 +6139,21 @@
             <ac:picMk id="1028" creationId="{A48F452C-7E91-4FA3-A336-9A334F63C595}"/>
           </ac:picMkLst>
         </pc:picChg>
+      </pc:sldChg>
+      <pc:sldChg chg="modSp">
+        <pc:chgData name="Kristofer Carta" userId="a949ead7c4bcd18f" providerId="LiveId" clId="{8B1725E7-4F78-4438-A95B-BD3CF9EE89A5}" dt="2017-08-31T10:22:16.760" v="17278" actId="20577"/>
+        <pc:sldMkLst>
+          <pc:docMk/>
+          <pc:sldMk cId="1484369849" sldId="373"/>
+        </pc:sldMkLst>
+        <pc:spChg chg="mod">
+          <ac:chgData name="Kristofer Carta" userId="a949ead7c4bcd18f" providerId="LiveId" clId="{8B1725E7-4F78-4438-A95B-BD3CF9EE89A5}" dt="2017-08-31T10:22:16.760" v="17278" actId="20577"/>
+          <ac:spMkLst>
+            <pc:docMk/>
+            <pc:sldMk cId="1484369849" sldId="373"/>
+            <ac:spMk id="3" creationId="{C38F677F-5E54-4956-B549-0933911FF3E4}"/>
+          </ac:spMkLst>
+        </pc:spChg>
       </pc:sldChg>
     </pc:docChg>
   </pc:docChgLst>
@@ -22255,15 +22266,7 @@
             </a:pPr>
             <a:r>
               <a:rPr lang="en-US" dirty="0"/>
-              <a:t>	- Nvidia if </a:t>
-            </a:r>
-            <a:r>
-              <a:rPr lang="en-US" u="sng" dirty="0"/>
-              <a:t>heavy</a:t>
-            </a:r>
-            <a:r>
-              <a:rPr lang="en-US" dirty="0"/>
-              <a:t> graphic processing</a:t>
+              <a:t>	- Nvidia if graphic processing</a:t>
             </a:r>
           </a:p>
           <a:p>
@@ -22299,7 +22302,7 @@
             </a:pPr>
             <a:r>
               <a:rPr lang="en-US" dirty="0"/>
-              <a:t>	- SSD</a:t>
+              <a:t>	- SSD, but beware of ~120GB models</a:t>
             </a:r>
           </a:p>
           <a:p>
@@ -22308,8 +22311,13 @@
             </a:pPr>
             <a:r>
               <a:rPr lang="en-US" dirty="0"/>
-              <a:t>	- HDD only if your budget is extremely limited</a:t>
-            </a:r>
+              <a:t>	- HDD only if your budget is extremely limited (can be </a:t>
+            </a:r>
+            <a:r>
+              <a:rPr lang="en-US"/>
+              <a:t>switched later)</a:t>
+            </a:r>
+            <a:endParaRPr lang="en-US" dirty="0"/>
           </a:p>
         </p:txBody>
       </p:sp>

</xml_diff>